<commit_message>
Updated tutorial to v2.3. Also updated slide deck
</commit_message>
<xml_diff>
--- a/or/Slides.pptx
+++ b/or/Slides.pptx
@@ -142,6 +142,22 @@
       </a:defRPr>
     </a:lvl9pPr>
   </p:defaultTextStyle>
+  <p:extLst>
+    <p:ext uri="{EFAFB233-063F-42B5-8137-9DF3F51BA10A}">
+      <p15:sldGuideLst xmlns:p15="http://schemas.microsoft.com/office/powerpoint/2012/main">
+        <p15:guide id="1" orient="horz" pos="2160">
+          <p15:clr>
+            <a:srgbClr val="A4A3A4"/>
+          </p15:clr>
+        </p15:guide>
+        <p15:guide id="2" pos="2880">
+          <p15:clr>
+            <a:srgbClr val="A4A3A4"/>
+          </p15:clr>
+        </p15:guide>
+      </p15:sldGuideLst>
+    </p:ext>
+  </p:extLst>
 </p:presentation>
 </file>
 
@@ -2286,7 +2302,7 @@
             <a:fld id="{A50241CD-06D9-FB46-ADDB-786EC3836AB7}" type="datetime1">
               <a:rPr lang="en-US"/>
               <a:pPr/>
-              <a:t>4/15/2014</a:t>
+              <a:t>6/30/17</a:t>
             </a:fld>
             <a:endParaRPr lang="en-US"/>
           </a:p>
@@ -2944,7 +2960,19 @@
           <a:p>
             <a:r>
               <a:rPr lang="en-US" dirty="0" smtClean="0"/>
-              <a:t>Then we get down to putting Open Refine to use</a:t>
+              <a:t>Then we get down to putting </a:t>
+            </a:r>
+            <a:r>
+              <a:rPr lang="en-US" dirty="0" err="1" smtClean="0"/>
+              <a:t>OpenRefine</a:t>
+            </a:r>
+            <a:r>
+              <a:rPr lang="en-US" dirty="0" smtClean="0"/>
+              <a:t> </a:t>
+            </a:r>
+            <a:r>
+              <a:rPr lang="en-US" dirty="0" smtClean="0"/>
+              <a:t>to use</a:t>
             </a:r>
           </a:p>
           <a:p>
@@ -2962,21 +2990,29 @@
           <a:p>
             <a:r>
               <a:rPr lang="en-US" dirty="0" smtClean="0"/>
-              <a:t>Start with basic set of data from OEH, then use Google </a:t>
-            </a:r>
-            <a:r>
-              <a:rPr lang="en-US" dirty="0" err="1" smtClean="0"/>
-              <a:t>Geolocation</a:t>
-            </a:r>
-            <a:r>
-              <a:rPr lang="en-US" dirty="0" smtClean="0"/>
-              <a:t> API, then State Records NSW API</a:t>
-            </a:r>
-          </a:p>
-          <a:p>
-            <a:r>
-              <a:rPr lang="en-US" dirty="0" smtClean="0"/>
-              <a:t>Not intended to be thorough research!</a:t>
+              <a:t>Start with basic set of data from OEH, </a:t>
+            </a:r>
+            <a:r>
+              <a:rPr lang="en-US" dirty="0" smtClean="0"/>
+              <a:t>clean the data set, then supplement by using the Google </a:t>
+            </a:r>
+            <a:r>
+              <a:rPr lang="en-US" dirty="0" smtClean="0"/>
+              <a:t>Geolocation </a:t>
+            </a:r>
+            <a:r>
+              <a:rPr lang="en-US" dirty="0" smtClean="0"/>
+              <a:t>API</a:t>
+            </a:r>
+          </a:p>
+          <a:p>
+            <a:r>
+              <a:rPr lang="en-US" dirty="0" smtClean="0"/>
+              <a:t>Not </a:t>
+            </a:r>
+            <a:r>
+              <a:rPr lang="en-US" dirty="0" smtClean="0"/>
+              <a:t>intended to be thorough research!</a:t>
             </a:r>
             <a:endParaRPr lang="en-US" dirty="0"/>
           </a:p>
@@ -3751,17 +3787,8 @@
             </a:pPr>
             <a:r>
               <a:rPr lang="en-US" sz="2800" dirty="0" smtClean="0"/>
-              <a:t>Get </a:t>
-            </a:r>
-            <a:r>
-              <a:rPr lang="en-US" sz="2800" dirty="0" smtClean="0"/>
-              <a:t>the </a:t>
-            </a:r>
-            <a:r>
-              <a:rPr lang="en-US" sz="2800" dirty="0" smtClean="0"/>
-              <a:t>tutorial from:</a:t>
-            </a:r>
-            <a:endParaRPr lang="en-US" sz="2800" dirty="0" smtClean="0"/>
+              <a:t>Get the tutorial from:</a:t>
+            </a:r>
           </a:p>
           <a:p>
             <a:pPr>
@@ -3777,12 +3804,15 @@
               <a:rPr lang="en-US" sz="2800" dirty="0" smtClean="0">
                 <a:hlinkClick r:id="rId2"/>
               </a:rPr>
-              <a:t>github.com/IntersectAustralia/TrainingMaterials/blob/master/CleaningAndExploringYourDataWithOpenRefine/Tutorial.pdf?raw=true</a:t>
-            </a:r>
-            <a:r>
-              <a:rPr lang="en-US" sz="2800" dirty="0" smtClean="0"/>
-              <a:t> </a:t>
-            </a:r>
+              <a:t>github.com/IntersectAustralia/TrainingMaterials/raw/master/or/Tutorial.pdf</a:t>
+            </a:r>
+            <a:endParaRPr lang="en-US" sz="2800" dirty="0"/>
+          </a:p>
+          <a:p>
+            <a:pPr>
+              <a:buNone/>
+            </a:pPr>
+            <a:endParaRPr lang="en-US" sz="2800" dirty="0" smtClean="0"/>
           </a:p>
           <a:p>
             <a:pPr>
@@ -3823,18 +3853,12 @@
               <a:rPr lang="en-US" sz="2800" dirty="0" smtClean="0">
                 <a:hlinkClick r:id="rId3"/>
               </a:rPr>
-              <a:t>raw.github.com/IntersectAustralia/TrainingMaterials/master/CleaningAndExploringYourDataWithOpenRefine/OEH_Data_Modified.txt</a:t>
+              <a:t>github.com/IntersectAustralia/TrainingMaterials/raw/master/or/OEH_Data_Modified.txt</a:t>
             </a:r>
             <a:r>
               <a:rPr lang="en-US" sz="2800" dirty="0" smtClean="0"/>
               <a:t> </a:t>
             </a:r>
-            <a:endParaRPr lang="en-US" sz="2800" dirty="0"/>
-          </a:p>
-          <a:p>
-            <a:pPr algn="ctr">
-              <a:buNone/>
-            </a:pPr>
             <a:endParaRPr lang="en-US" sz="2800" dirty="0" smtClean="0"/>
           </a:p>
           <a:p>
@@ -3952,7 +3976,9 @@
             </a:r>
           </a:p>
           <a:p>
-            <a:pPr algn="ctr"/>
+            <a:pPr marL="0" indent="0" algn="ctr">
+              <a:buNone/>
+            </a:pPr>
             <a:r>
               <a:rPr lang="en-AU" dirty="0">
                 <a:hlinkClick r:id="rId2"/>
@@ -3969,6 +3995,11 @@
               <a:rPr lang="en-AU" dirty="0" smtClean="0"/>
               <a:t> </a:t>
             </a:r>
+            <a:endParaRPr lang="en-AU" dirty="0" smtClean="0"/>
+          </a:p>
+          <a:p>
+            <a:pPr algn="ctr"/>
+            <a:endParaRPr lang="en-AU" dirty="0" smtClean="0"/>
           </a:p>
           <a:p>
             <a:pPr marL="0" indent="0" algn="ctr">
@@ -3988,7 +4019,9 @@
             </a:r>
           </a:p>
           <a:p>
-            <a:pPr algn="ctr"/>
+            <a:pPr marL="0" indent="0" algn="ctr">
+              <a:buNone/>
+            </a:pPr>
             <a:r>
               <a:rPr lang="en-AU" dirty="0" smtClean="0">
                 <a:hlinkClick r:id="rId3"/>
@@ -3997,8 +4030,13 @@
             </a:r>
             <a:r>
               <a:rPr lang="en-AU" dirty="0" smtClean="0"/>
-              <a:t>  </a:t>
-            </a:r>
+              <a:t> </a:t>
+            </a:r>
+            <a:endParaRPr lang="en-AU" dirty="0" smtClean="0"/>
+          </a:p>
+          <a:p>
+            <a:pPr algn="ctr"/>
+            <a:endParaRPr lang="en-AU" dirty="0" smtClean="0"/>
           </a:p>
           <a:p>
             <a:pPr algn="ctr"/>
@@ -4012,22 +4050,19 @@
             </a:r>
             <a:r>
               <a:rPr lang="en-AU" dirty="0" smtClean="0"/>
-              <a:t>by signing up to our mailing list </a:t>
-            </a:r>
-          </a:p>
-          <a:p>
-            <a:pPr algn="ctr"/>
+              <a:t>by signing up to our </a:t>
+            </a:r>
             <a:r>
               <a:rPr lang="en-AU" dirty="0" smtClean="0">
                 <a:hlinkClick r:id="rId4"/>
               </a:rPr>
-              <a:t>http</a:t>
-            </a:r>
-            <a:r>
-              <a:rPr lang="en-AU" dirty="0">
+              <a:t>mailing </a:t>
+            </a:r>
+            <a:r>
+              <a:rPr lang="en-AU" dirty="0" smtClean="0">
                 <a:hlinkClick r:id="rId4"/>
               </a:rPr>
-              <a:t>://bit.ly/1aZvRqw</a:t>
+              <a:t>list</a:t>
             </a:r>
             <a:endParaRPr lang="en-AU" dirty="0" smtClean="0"/>
           </a:p>

</xml_diff>

<commit_message>
Replaced hyperlinks with short URLs due to linebreak issue in .pdf
</commit_message>
<xml_diff>
--- a/or/Slides.pptx
+++ b/or/Slides.pptx
@@ -3804,9 +3804,9 @@
               <a:rPr lang="en-US" sz="2800" dirty="0" smtClean="0">
                 <a:hlinkClick r:id="rId2"/>
               </a:rPr>
-              <a:t>github.com/IntersectAustralia/TrainingMaterials/raw/master/or/Tutorial.pdf</a:t>
-            </a:r>
-            <a:endParaRPr lang="en-US" sz="2800" dirty="0"/>
+              <a:t>goo.gl/xBH2TT</a:t>
+            </a:r>
+            <a:endParaRPr lang="en-US" sz="2800" dirty="0" smtClean="0"/>
           </a:p>
           <a:p>
             <a:pPr>
@@ -3853,15 +3853,12 @@
               <a:rPr lang="en-US" sz="2800" dirty="0" smtClean="0">
                 <a:hlinkClick r:id="rId3"/>
               </a:rPr>
-              <a:t>github.com/IntersectAustralia/TrainingMaterials/raw/master/or/OEH_Data_Modified.txt</a:t>
+              <a:t>goo.gl/wuzEEv</a:t>
             </a:r>
             <a:r>
               <a:rPr lang="en-US" sz="2800" dirty="0" smtClean="0"/>
               <a:t> </a:t>
             </a:r>
-            <a:endParaRPr lang="en-US" sz="2800" dirty="0" smtClean="0"/>
-          </a:p>
-          <a:p>
             <a:endParaRPr lang="en-US" dirty="0" smtClean="0"/>
           </a:p>
         </p:txBody>
@@ -3995,11 +3992,6 @@
               <a:rPr lang="en-AU" dirty="0" smtClean="0"/>
               <a:t> </a:t>
             </a:r>
-            <a:endParaRPr lang="en-AU" dirty="0" smtClean="0"/>
-          </a:p>
-          <a:p>
-            <a:pPr algn="ctr"/>
-            <a:endParaRPr lang="en-AU" dirty="0" smtClean="0"/>
           </a:p>
           <a:p>
             <a:pPr marL="0" indent="0" algn="ctr">
@@ -4032,11 +4024,6 @@
               <a:rPr lang="en-AU" dirty="0" smtClean="0"/>
               <a:t> </a:t>
             </a:r>
-            <a:endParaRPr lang="en-AU" dirty="0" smtClean="0"/>
-          </a:p>
-          <a:p>
-            <a:pPr algn="ctr"/>
-            <a:endParaRPr lang="en-AU" dirty="0" smtClean="0"/>
           </a:p>
           <a:p>
             <a:pPr algn="ctr"/>
@@ -4050,19 +4037,32 @@
             </a:r>
             <a:r>
               <a:rPr lang="en-AU" dirty="0" smtClean="0"/>
-              <a:t>by signing up to our </a:t>
+              <a:t>by signing up to </a:t>
+            </a:r>
+            <a:r>
+              <a:rPr lang="en-AU" dirty="0" smtClean="0"/>
+              <a:t>our mailing list</a:t>
+            </a:r>
+          </a:p>
+          <a:p>
+            <a:pPr marL="0" indent="0" algn="ctr">
+              <a:buNone/>
+            </a:pPr>
+            <a:r>
+              <a:rPr lang="en-AU" dirty="0">
+                <a:hlinkClick r:id="rId4"/>
+              </a:rPr>
+              <a:t>https://</a:t>
             </a:r>
             <a:r>
               <a:rPr lang="en-AU" dirty="0" smtClean="0">
                 <a:hlinkClick r:id="rId4"/>
               </a:rPr>
-              <a:t>mailing </a:t>
-            </a:r>
-            <a:r>
-              <a:rPr lang="en-AU" dirty="0" smtClean="0">
-                <a:hlinkClick r:id="rId4"/>
-              </a:rPr>
-              <a:t>list</a:t>
+              <a:t>goo.gl/EceC7J</a:t>
+            </a:r>
+            <a:r>
+              <a:rPr lang="en-AU" dirty="0" smtClean="0"/>
+              <a:t> </a:t>
             </a:r>
             <a:endParaRPr lang="en-AU" dirty="0" smtClean="0"/>
           </a:p>

</xml_diff>